<commit_message>
adding mesh terms related code
</commit_message>
<xml_diff>
--- a/r_table/slides/Authority look up table.pptx
+++ b/r_table/slides/Authority look up table.pptx
@@ -383,7 +383,7 @@
           <a:p>
             <a:fld id="{0C7EF424-2B96-41A9-9E55-352BE5C452E6}" type="datetimeFigureOut">
               <a:rPr lang="en-US" smtClean="0"/>
-              <a:t>9/22/2020</a:t>
+              <a:t>9/23/2020</a:t>
             </a:fld>
             <a:endParaRPr lang="en-US"/>
           </a:p>
@@ -591,7 +591,7 @@
           <a:p>
             <a:fld id="{0C7EF424-2B96-41A9-9E55-352BE5C452E6}" type="datetimeFigureOut">
               <a:rPr lang="en-US" smtClean="0"/>
-              <a:t>9/22/2020</a:t>
+              <a:t>9/23/2020</a:t>
             </a:fld>
             <a:endParaRPr lang="en-US"/>
           </a:p>
@@ -847,7 +847,7 @@
           <a:p>
             <a:fld id="{0C7EF424-2B96-41A9-9E55-352BE5C452E6}" type="datetimeFigureOut">
               <a:rPr lang="en-US" smtClean="0"/>
-              <a:t>9/22/2020</a:t>
+              <a:t>9/23/2020</a:t>
             </a:fld>
             <a:endParaRPr lang="en-US"/>
           </a:p>
@@ -1021,7 +1021,7 @@
           <a:p>
             <a:fld id="{0C7EF424-2B96-41A9-9E55-352BE5C452E6}" type="datetimeFigureOut">
               <a:rPr lang="en-US" smtClean="0"/>
-              <a:t>9/22/2020</a:t>
+              <a:t>9/23/2020</a:t>
             </a:fld>
             <a:endParaRPr lang="en-US"/>
           </a:p>
@@ -1364,7 +1364,7 @@
           <a:p>
             <a:fld id="{0C7EF424-2B96-41A9-9E55-352BE5C452E6}" type="datetimeFigureOut">
               <a:rPr lang="en-US" smtClean="0"/>
-              <a:t>9/22/2020</a:t>
+              <a:t>9/23/2020</a:t>
             </a:fld>
             <a:endParaRPr lang="en-US"/>
           </a:p>
@@ -1639,7 +1639,7 @@
           <a:p>
             <a:fld id="{0C7EF424-2B96-41A9-9E55-352BE5C452E6}" type="datetimeFigureOut">
               <a:rPr lang="en-US" smtClean="0"/>
-              <a:t>9/22/2020</a:t>
+              <a:t>9/23/2020</a:t>
             </a:fld>
             <a:endParaRPr lang="en-US"/>
           </a:p>
@@ -2018,7 +2018,7 @@
           <a:p>
             <a:fld id="{0C7EF424-2B96-41A9-9E55-352BE5C452E6}" type="datetimeFigureOut">
               <a:rPr lang="en-US" smtClean="0"/>
-              <a:t>9/22/2020</a:t>
+              <a:t>9/23/2020</a:t>
             </a:fld>
             <a:endParaRPr lang="en-US"/>
           </a:p>
@@ -2136,7 +2136,7 @@
           <a:p>
             <a:fld id="{0C7EF424-2B96-41A9-9E55-352BE5C452E6}" type="datetimeFigureOut">
               <a:rPr lang="en-US" smtClean="0"/>
-              <a:t>9/22/2020</a:t>
+              <a:t>9/23/2020</a:t>
             </a:fld>
             <a:endParaRPr lang="en-US"/>
           </a:p>
@@ -2307,7 +2307,7 @@
           <a:p>
             <a:fld id="{0C7EF424-2B96-41A9-9E55-352BE5C452E6}" type="datetimeFigureOut">
               <a:rPr lang="en-US" smtClean="0"/>
-              <a:t>9/22/2020</a:t>
+              <a:t>9/23/2020</a:t>
             </a:fld>
             <a:endParaRPr lang="en-US"/>
           </a:p>
@@ -2661,7 +2661,7 @@
           <a:p>
             <a:fld id="{0C7EF424-2B96-41A9-9E55-352BE5C452E6}" type="datetimeFigureOut">
               <a:rPr lang="en-US" smtClean="0"/>
-              <a:t>9/22/2020</a:t>
+              <a:t>9/23/2020</a:t>
             </a:fld>
             <a:endParaRPr lang="en-US"/>
           </a:p>
@@ -3043,7 +3043,7 @@
           <a:p>
             <a:fld id="{0C7EF424-2B96-41A9-9E55-352BE5C452E6}" type="datetimeFigureOut">
               <a:rPr lang="en-US" smtClean="0"/>
-              <a:t>9/22/2020</a:t>
+              <a:t>9/23/2020</a:t>
             </a:fld>
             <a:endParaRPr lang="en-US"/>
           </a:p>
@@ -3330,7 +3330,7 @@
           <a:p>
             <a:fld id="{0C7EF424-2B96-41A9-9E55-352BE5C452E6}" type="datetimeFigureOut">
               <a:rPr lang="en-US" smtClean="0"/>
-              <a:t>9/22/2020</a:t>
+              <a:t>9/23/2020</a:t>
             </a:fld>
             <a:endParaRPr lang="en-US"/>
           </a:p>
@@ -4838,8 +4838,36 @@
             </a:r>
             <a:r>
               <a:rPr lang="en-US" dirty="0"/>
-              <a:t>) is smoothened to improve accuracies and to ensure monotonicity. </a:t>
-            </a:r>
+              <a:t>) is smoothened to improve accuracies and to ensure monotonicity. r(x) &lt;= r(y) for all (</a:t>
+            </a:r>
+            <a:r>
+              <a:rPr lang="en-US" dirty="0" err="1"/>
+              <a:t>x,y</a:t>
+            </a:r>
+            <a:r>
+              <a:rPr lang="en-US" dirty="0"/>
+              <a:t>) where xi&lt;=</a:t>
+            </a:r>
+            <a:r>
+              <a:rPr lang="en-US" dirty="0" err="1"/>
+              <a:t>yi</a:t>
+            </a:r>
+            <a:r>
+              <a:rPr lang="en-US" dirty="0"/>
+              <a:t> </a:t>
+            </a:r>
+            <a:r>
+              <a:rPr lang="en-US" dirty="0" err="1"/>
+              <a:t>i</a:t>
+            </a:r>
+            <a:r>
+              <a:rPr lang="en-US" dirty="0"/>
+              <a:t>=1,2,3,4,5,7. </a:t>
+            </a:r>
+            <a:br>
+              <a:rPr lang="en-US" dirty="0"/>
+            </a:br>
+            <a:endParaRPr lang="en-US" dirty="0"/>
           </a:p>
           <a:p>
             <a:pPr marL="0" indent="0">
@@ -4847,11 +4875,50 @@
             </a:pPr>
             <a:r>
               <a:rPr lang="en-US" dirty="0"/>
+              <a:t>	Example: </a:t>
+            </a:r>
+          </a:p>
+          <a:p>
+            <a:pPr marL="0" indent="0">
+              <a:buNone/>
+            </a:pPr>
+            <a:r>
+              <a:rPr lang="en-US" dirty="0"/>
               <a:t>       </a:t>
             </a:r>
           </a:p>
         </p:txBody>
       </p:sp>
+      <p:pic>
+        <p:nvPicPr>
+          <p:cNvPr id="2" name="Picture 1">
+            <a:extLst>
+              <a:ext uri="{FF2B5EF4-FFF2-40B4-BE49-F238E27FC236}">
+                <a16:creationId xmlns:a16="http://schemas.microsoft.com/office/drawing/2014/main" id="{EA41C1F4-BA92-4B21-93D4-4522808D903B}"/>
+              </a:ext>
+            </a:extLst>
+          </p:cNvPr>
+          <p:cNvPicPr>
+            <a:picLocks noChangeAspect="1"/>
+          </p:cNvPicPr>
+          <p:nvPr/>
+        </p:nvPicPr>
+        <p:blipFill>
+          <a:blip r:embed="rId2"/>
+          <a:stretch>
+            <a:fillRect/>
+          </a:stretch>
+        </p:blipFill>
+        <p:spPr>
+          <a:xfrm>
+            <a:off x="958316" y="5143199"/>
+            <a:ext cx="10395484" cy="450873"/>
+          </a:xfrm>
+          <a:prstGeom prst="rect">
+            <a:avLst/>
+          </a:prstGeom>
+        </p:spPr>
+      </p:pic>
     </p:spTree>
     <p:extLst>
       <p:ext uri="{BB962C8B-B14F-4D97-AF65-F5344CB8AC3E}">
@@ -6399,16 +6466,108 @@
             <a:br>
               <a:rPr lang="en-US" dirty="0"/>
             </a:br>
-            <a:r>
-              <a:rPr lang="en-US" dirty="0"/>
-              <a:t>Article 1</a:t>
-            </a:r>
+            <a:endParaRPr lang="en-US" dirty="0"/>
           </a:p>
           <a:p>
             <a:pPr marL="0" indent="0">
               <a:buNone/>
             </a:pPr>
             <a:endParaRPr lang="en-US" dirty="0"/>
+          </a:p>
+        </p:txBody>
+      </p:sp>
+      <p:pic>
+        <p:nvPicPr>
+          <p:cNvPr id="6" name="Picture 5">
+            <a:extLst>
+              <a:ext uri="{FF2B5EF4-FFF2-40B4-BE49-F238E27FC236}">
+                <a16:creationId xmlns:a16="http://schemas.microsoft.com/office/drawing/2014/main" id="{60A643E9-DF0E-4FFD-B882-8F643385C678}"/>
+              </a:ext>
+            </a:extLst>
+          </p:cNvPr>
+          <p:cNvPicPr>
+            <a:picLocks noChangeAspect="1"/>
+          </p:cNvPicPr>
+          <p:nvPr/>
+        </p:nvPicPr>
+        <p:blipFill>
+          <a:blip r:embed="rId2"/>
+          <a:stretch>
+            <a:fillRect/>
+          </a:stretch>
+        </p:blipFill>
+        <p:spPr>
+          <a:xfrm>
+            <a:off x="1097280" y="3372814"/>
+            <a:ext cx="10914611" cy="417172"/>
+          </a:xfrm>
+          <a:prstGeom prst="rect">
+            <a:avLst/>
+          </a:prstGeom>
+        </p:spPr>
+      </p:pic>
+      <p:pic>
+        <p:nvPicPr>
+          <p:cNvPr id="7" name="Picture 6">
+            <a:extLst>
+              <a:ext uri="{FF2B5EF4-FFF2-40B4-BE49-F238E27FC236}">
+                <a16:creationId xmlns:a16="http://schemas.microsoft.com/office/drawing/2014/main" id="{313B5809-20DC-430D-B420-82565ADCA468}"/>
+              </a:ext>
+            </a:extLst>
+          </p:cNvPr>
+          <p:cNvPicPr>
+            <a:picLocks noChangeAspect="1"/>
+          </p:cNvPicPr>
+          <p:nvPr/>
+        </p:nvPicPr>
+        <p:blipFill>
+          <a:blip r:embed="rId3"/>
+          <a:stretch>
+            <a:fillRect/>
+          </a:stretch>
+        </p:blipFill>
+        <p:spPr>
+          <a:xfrm>
+            <a:off x="1097280" y="4001267"/>
+            <a:ext cx="10914611" cy="421027"/>
+          </a:xfrm>
+          <a:prstGeom prst="rect">
+            <a:avLst/>
+          </a:prstGeom>
+        </p:spPr>
+      </p:pic>
+      <p:sp>
+        <p:nvSpPr>
+          <p:cNvPr id="8" name="TextBox 7">
+            <a:extLst>
+              <a:ext uri="{FF2B5EF4-FFF2-40B4-BE49-F238E27FC236}">
+                <a16:creationId xmlns:a16="http://schemas.microsoft.com/office/drawing/2014/main" id="{CB91B331-05AA-4DF1-8302-54FE0831ECEE}"/>
+              </a:ext>
+            </a:extLst>
+          </p:cNvPr>
+          <p:cNvSpPr txBox="1"/>
+          <p:nvPr/>
+        </p:nvSpPr>
+        <p:spPr>
+          <a:xfrm>
+            <a:off x="1097280" y="4696691"/>
+            <a:ext cx="10859193" cy="369332"/>
+          </a:xfrm>
+          <a:prstGeom prst="rect">
+            <a:avLst/>
+          </a:prstGeom>
+          <a:noFill/>
+        </p:spPr>
+        <p:txBody>
+          <a:bodyPr wrap="square" rtlCol="0">
+            <a:spAutoFit/>
+          </a:bodyPr>
+          <a:lstStyle/>
+          <a:p>
+            <a:r>
+              <a:rPr lang="en-US" dirty="0"/>
+              <a:t>x1 = 3, x2 = 0, x3 = 0, x4 = 1, x5 = 0, x7 = 2</a:t>
+            </a:r>
           </a:p>
         </p:txBody>
       </p:sp>
@@ -6628,7 +6787,7 @@
           <a:p>
             <a:r>
               <a:rPr lang="en-US" dirty="0"/>
-              <a:t>Positive sets similarity profiles:</a:t>
+              <a:t>Positive sets similarity profiles	   Negative sets similarity profiles </a:t>
             </a:r>
           </a:p>
           <a:p>
@@ -6654,14 +6813,14 @@
           <p:nvPr>
             <p:extLst>
               <p:ext uri="{D42A27DB-BD31-4B8C-83A1-F6EECF244321}">
-                <p14:modId xmlns:p14="http://schemas.microsoft.com/office/powerpoint/2010/main" val="2705106844"/>
+                <p14:modId xmlns:p14="http://schemas.microsoft.com/office/powerpoint/2010/main" val="2336249087"/>
               </p:ext>
             </p:extLst>
           </p:nvPr>
         </p:nvGraphicFramePr>
         <p:xfrm>
           <a:off x="1089891" y="2345266"/>
-          <a:ext cx="8128000" cy="1849120"/>
+          <a:ext cx="3565236" cy="2103120"/>
         </p:xfrm>
         <a:graphic>
           <a:graphicData uri="http://schemas.openxmlformats.org/drawingml/2006/table">
@@ -6670,14 +6829,14 @@
                 <a:tableStyleId>{5C22544A-7EE6-4342-B048-85BDC9FD1C3A}</a:tableStyleId>
               </a:tblPr>
               <a:tblGrid>
-                <a:gridCol w="4064000">
+                <a:gridCol w="1782618">
                   <a:extLst>
                     <a:ext uri="{9D8B030D-6E8A-4147-A177-3AD203B41FA5}">
                       <a16:colId xmlns:a16="http://schemas.microsoft.com/office/drawing/2014/main" val="485236428"/>
                     </a:ext>
                   </a:extLst>
                 </a:gridCol>
-                <a:gridCol w="4064000">
+                <a:gridCol w="1782618">
                   <a:extLst>
                     <a:ext uri="{9D8B030D-6E8A-4147-A177-3AD203B41FA5}">
                       <a16:colId xmlns:a16="http://schemas.microsoft.com/office/drawing/2014/main" val="4113649343"/>
@@ -6685,7 +6844,7 @@
                   </a:extLst>
                 </a:gridCol>
               </a:tblGrid>
-              <a:tr h="0">
+              <a:tr h="286963">
                 <a:tc>
                   <a:txBody>
                     <a:bodyPr/>
@@ -6706,7 +6865,7 @@
                     <a:p>
                       <a:r>
                         <a:rPr lang="en-US" dirty="0"/>
-                        <a:t>Similarity profile</a:t>
+                        <a:t>Similarity profile &lt;x&gt;</a:t>
                       </a:r>
                     </a:p>
                   </a:txBody>
@@ -6718,7 +6877,7 @@
                   </a:ext>
                 </a:extLst>
               </a:tr>
-              <a:tr h="370840">
+              <a:tr h="290949">
                 <a:tc>
                   <a:txBody>
                     <a:bodyPr/>
@@ -6739,7 +6898,7 @@
                     <a:p>
                       <a:r>
                         <a:rPr lang="en-US" dirty="0"/>
-                        <a:t>&lt;</a:t>
+                        <a:t>&lt;3, 0, 0, 1, 0, 2&gt;</a:t>
                       </a:r>
                     </a:p>
                   </a:txBody>
@@ -6751,13 +6910,16 @@
                   </a:ext>
                 </a:extLst>
               </a:tr>
-              <a:tr h="370840">
+              <a:tr h="290949">
                 <a:tc>
                   <a:txBody>
                     <a:bodyPr/>
                     <a:lstStyle/>
                     <a:p>
-                      <a:endParaRPr lang="en-US" dirty="0"/>
+                      <a:r>
+                        <a:rPr lang="en-US" dirty="0"/>
+                        <a:t>(a2, b2)</a:t>
+                      </a:r>
                     </a:p>
                   </a:txBody>
                   <a:tcPr/>
@@ -6767,7 +6929,10 @@
                     <a:bodyPr/>
                     <a:lstStyle/>
                     <a:p>
-                      <a:endParaRPr lang="en-US"/>
+                      <a:r>
+                        <a:rPr lang="en-US" dirty="0"/>
+                        <a:t>&lt;2, 1, 1, 0, 0, 2&gt;</a:t>
+                      </a:r>
                     </a:p>
                   </a:txBody>
                   <a:tcPr/>
@@ -6778,13 +6943,16 @@
                   </a:ext>
                 </a:extLst>
               </a:tr>
-              <a:tr h="370840">
+              <a:tr h="290949">
                 <a:tc>
                   <a:txBody>
                     <a:bodyPr/>
                     <a:lstStyle/>
                     <a:p>
-                      <a:endParaRPr lang="en-US"/>
+                      <a:r>
+                        <a:rPr lang="en-US" dirty="0"/>
+                        <a:t>(a3, b3)</a:t>
+                      </a:r>
                     </a:p>
                   </a:txBody>
                   <a:tcPr/>
@@ -6794,7 +6962,10 @@
                     <a:bodyPr/>
                     <a:lstStyle/>
                     <a:p>
-                      <a:endParaRPr lang="en-US"/>
+                      <a:r>
+                        <a:rPr lang="en-US" dirty="0"/>
+                        <a:t>&lt;2, 1, 1, 0, 0, 2&gt;</a:t>
+                      </a:r>
                     </a:p>
                   </a:txBody>
                   <a:tcPr/>
@@ -6805,13 +6976,16 @@
                   </a:ext>
                 </a:extLst>
               </a:tr>
-              <a:tr h="370840">
+              <a:tr h="290949">
                 <a:tc>
                   <a:txBody>
                     <a:bodyPr/>
                     <a:lstStyle/>
                     <a:p>
-                      <a:endParaRPr lang="en-US"/>
+                      <a:r>
+                        <a:rPr lang="en-US" dirty="0"/>
+                        <a:t>(a4, b4)</a:t>
+                      </a:r>
                     </a:p>
                   </a:txBody>
                   <a:tcPr/>
@@ -6821,7 +6995,10 @@
                     <a:bodyPr/>
                     <a:lstStyle/>
                     <a:p>
-                      <a:endParaRPr lang="en-US" dirty="0"/>
+                      <a:r>
+                        <a:rPr lang="en-US" dirty="0"/>
+                        <a:t>&lt;2, 1, 1, 0, 0, 2&gt;</a:t>
+                      </a:r>
                     </a:p>
                   </a:txBody>
                   <a:tcPr/>
@@ -6836,6 +7013,256 @@
           </a:graphicData>
         </a:graphic>
       </p:graphicFrame>
+      <p:graphicFrame>
+        <p:nvGraphicFramePr>
+          <p:cNvPr id="6" name="Table 5">
+            <a:extLst>
+              <a:ext uri="{FF2B5EF4-FFF2-40B4-BE49-F238E27FC236}">
+                <a16:creationId xmlns:a16="http://schemas.microsoft.com/office/drawing/2014/main" id="{693CA9DF-FFB1-4E5D-B444-3E3099F0F4C7}"/>
+              </a:ext>
+            </a:extLst>
+          </p:cNvPr>
+          <p:cNvGraphicFramePr>
+            <a:graphicFrameLocks noGrp="1"/>
+          </p:cNvGraphicFramePr>
+          <p:nvPr>
+            <p:extLst>
+              <p:ext uri="{D42A27DB-BD31-4B8C-83A1-F6EECF244321}">
+                <p14:modId xmlns:p14="http://schemas.microsoft.com/office/powerpoint/2010/main" val="1358830698"/>
+              </p:ext>
+            </p:extLst>
+          </p:nvPr>
+        </p:nvGraphicFramePr>
+        <p:xfrm>
+          <a:off x="4900036" y="2320636"/>
+          <a:ext cx="4133128" cy="2107140"/>
+        </p:xfrm>
+        <a:graphic>
+          <a:graphicData uri="http://schemas.openxmlformats.org/drawingml/2006/table">
+            <a:tbl>
+              <a:tblPr firstRow="1" bandRow="1">
+                <a:tableStyleId>{5C22544A-7EE6-4342-B048-85BDC9FD1C3A}</a:tableStyleId>
+              </a:tblPr>
+              <a:tblGrid>
+                <a:gridCol w="2066564">
+                  <a:extLst>
+                    <a:ext uri="{9D8B030D-6E8A-4147-A177-3AD203B41FA5}">
+                      <a16:colId xmlns:a16="http://schemas.microsoft.com/office/drawing/2014/main" val="1814086611"/>
+                    </a:ext>
+                  </a:extLst>
+                </a:gridCol>
+                <a:gridCol w="2066564">
+                  <a:extLst>
+                    <a:ext uri="{9D8B030D-6E8A-4147-A177-3AD203B41FA5}">
+                      <a16:colId xmlns:a16="http://schemas.microsoft.com/office/drawing/2014/main" val="2569608730"/>
+                    </a:ext>
+                  </a:extLst>
+                </a:gridCol>
+              </a:tblGrid>
+              <a:tr h="361741">
+                <a:tc>
+                  <a:txBody>
+                    <a:bodyPr/>
+                    <a:lstStyle/>
+                    <a:p>
+                      <a:r>
+                        <a:rPr lang="en-US" dirty="0"/>
+                        <a:t>Pair</a:t>
+                      </a:r>
+                    </a:p>
+                  </a:txBody>
+                  <a:tcPr/>
+                </a:tc>
+                <a:tc>
+                  <a:txBody>
+                    <a:bodyPr/>
+                    <a:lstStyle/>
+                    <a:p>
+                      <a:r>
+                        <a:rPr lang="en-US" dirty="0"/>
+                        <a:t>Similarity profile &lt;x&gt;</a:t>
+                      </a:r>
+                    </a:p>
+                  </a:txBody>
+                  <a:tcPr/>
+                </a:tc>
+                <a:extLst>
+                  <a:ext uri="{0D108BD9-81ED-4DB2-BD59-A6C34878D82A}">
+                    <a16:rowId xmlns:a16="http://schemas.microsoft.com/office/drawing/2014/main" val="406610723"/>
+                  </a:ext>
+                </a:extLst>
+              </a:tr>
+              <a:tr h="366765">
+                <a:tc>
+                  <a:txBody>
+                    <a:bodyPr/>
+                    <a:lstStyle/>
+                    <a:p>
+                      <a:r>
+                        <a:rPr lang="en-US" dirty="0"/>
+                        <a:t>(a5, b5)</a:t>
+                      </a:r>
+                    </a:p>
+                  </a:txBody>
+                  <a:tcPr/>
+                </a:tc>
+                <a:tc>
+                  <a:txBody>
+                    <a:bodyPr/>
+                    <a:lstStyle/>
+                    <a:p>
+                      <a:r>
+                        <a:rPr lang="en-US" dirty="0"/>
+                        <a:t>&lt;3, 1, 0, 1, 0, 1&gt;</a:t>
+                      </a:r>
+                    </a:p>
+                  </a:txBody>
+                  <a:tcPr/>
+                </a:tc>
+                <a:extLst>
+                  <a:ext uri="{0D108BD9-81ED-4DB2-BD59-A6C34878D82A}">
+                    <a16:rowId xmlns:a16="http://schemas.microsoft.com/office/drawing/2014/main" val="1691134446"/>
+                  </a:ext>
+                </a:extLst>
+              </a:tr>
+              <a:tr h="366765">
+                <a:tc>
+                  <a:txBody>
+                    <a:bodyPr/>
+                    <a:lstStyle/>
+                    <a:p>
+                      <a:r>
+                        <a:rPr lang="en-US" dirty="0"/>
+                        <a:t>(a6, b6)</a:t>
+                      </a:r>
+                    </a:p>
+                  </a:txBody>
+                  <a:tcPr/>
+                </a:tc>
+                <a:tc>
+                  <a:txBody>
+                    <a:bodyPr/>
+                    <a:lstStyle/>
+                    <a:p>
+                      <a:r>
+                        <a:rPr lang="en-US" dirty="0"/>
+                        <a:t>&lt;1, 1, 1, 0, 0, 2&gt;</a:t>
+                      </a:r>
+                    </a:p>
+                  </a:txBody>
+                  <a:tcPr/>
+                </a:tc>
+                <a:extLst>
+                  <a:ext uri="{0D108BD9-81ED-4DB2-BD59-A6C34878D82A}">
+                    <a16:rowId xmlns:a16="http://schemas.microsoft.com/office/drawing/2014/main" val="3336823652"/>
+                  </a:ext>
+                </a:extLst>
+              </a:tr>
+              <a:tr h="366765">
+                <a:tc>
+                  <a:txBody>
+                    <a:bodyPr/>
+                    <a:lstStyle/>
+                    <a:p>
+                      <a:r>
+                        <a:rPr lang="en-US" dirty="0"/>
+                        <a:t>(a7, b7)</a:t>
+                      </a:r>
+                    </a:p>
+                  </a:txBody>
+                  <a:tcPr/>
+                </a:tc>
+                <a:tc>
+                  <a:txBody>
+                    <a:bodyPr/>
+                    <a:lstStyle/>
+                    <a:p>
+                      <a:r>
+                        <a:rPr lang="en-US" dirty="0"/>
+                        <a:t>&lt;2, 1, 1, 0, 0, 2&gt;</a:t>
+                      </a:r>
+                    </a:p>
+                  </a:txBody>
+                  <a:tcPr/>
+                </a:tc>
+                <a:extLst>
+                  <a:ext uri="{0D108BD9-81ED-4DB2-BD59-A6C34878D82A}">
+                    <a16:rowId xmlns:a16="http://schemas.microsoft.com/office/drawing/2014/main" val="644855702"/>
+                  </a:ext>
+                </a:extLst>
+              </a:tr>
+              <a:tr h="366765">
+                <a:tc>
+                  <a:txBody>
+                    <a:bodyPr/>
+                    <a:lstStyle/>
+                    <a:p>
+                      <a:r>
+                        <a:rPr lang="en-US" dirty="0"/>
+                        <a:t>(a8, b8)</a:t>
+                      </a:r>
+                    </a:p>
+                  </a:txBody>
+                  <a:tcPr/>
+                </a:tc>
+                <a:tc>
+                  <a:txBody>
+                    <a:bodyPr/>
+                    <a:lstStyle/>
+                    <a:p>
+                      <a:r>
+                        <a:rPr lang="en-US" dirty="0"/>
+                        <a:t>&lt;3, 1, 1, 0, 0, 2&gt;</a:t>
+                      </a:r>
+                    </a:p>
+                  </a:txBody>
+                  <a:tcPr/>
+                </a:tc>
+                <a:extLst>
+                  <a:ext uri="{0D108BD9-81ED-4DB2-BD59-A6C34878D82A}">
+                    <a16:rowId xmlns:a16="http://schemas.microsoft.com/office/drawing/2014/main" val="1184654957"/>
+                  </a:ext>
+                </a:extLst>
+              </a:tr>
+            </a:tbl>
+          </a:graphicData>
+        </a:graphic>
+      </p:graphicFrame>
+      <p:sp>
+        <p:nvSpPr>
+          <p:cNvPr id="7" name="TextBox 6">
+            <a:extLst>
+              <a:ext uri="{FF2B5EF4-FFF2-40B4-BE49-F238E27FC236}">
+                <a16:creationId xmlns:a16="http://schemas.microsoft.com/office/drawing/2014/main" id="{99C531BC-99ED-40EE-B021-D39D98BC7EA3}"/>
+              </a:ext>
+            </a:extLst>
+          </p:cNvPr>
+          <p:cNvSpPr txBox="1"/>
+          <p:nvPr/>
+        </p:nvSpPr>
+        <p:spPr>
+          <a:xfrm>
+            <a:off x="1097280" y="4475018"/>
+            <a:ext cx="10540538" cy="646331"/>
+          </a:xfrm>
+          <a:prstGeom prst="rect">
+            <a:avLst/>
+          </a:prstGeom>
+          <a:noFill/>
+        </p:spPr>
+        <p:txBody>
+          <a:bodyPr wrap="square" rtlCol="0">
+            <a:spAutoFit/>
+          </a:bodyPr>
+          <a:lstStyle/>
+          <a:p>
+            <a:r>
+              <a:rPr lang="en-US" dirty="0"/>
+              <a:t>Given a pair of articles (a9, b9) with similarity profile x = &lt;2, 1, 1, 0, 0, 2&gt;, they are most likely written by the same individual. </a:t>
+            </a:r>
+          </a:p>
+        </p:txBody>
+      </p:sp>
     </p:spTree>
     <p:extLst>
       <p:ext uri="{BB962C8B-B14F-4D97-AF65-F5344CB8AC3E}">

</xml_diff>